<commit_message>
add revised figures and manuscript
</commit_message>
<xml_diff>
--- a/Paper Supplementary Figure S1 and S2.pptx
+++ b/Paper Supplementary Figure S1 and S2.pptx
@@ -4,9 +4,14 @@
   <p:sldMasterIdLst>
     <p:sldMasterId id="2147483672" r:id="rId1"/>
   </p:sldMasterIdLst>
+  <p:notesMasterIdLst>
+    <p:notesMasterId r:id="rId6"/>
+  </p:notesMasterIdLst>
   <p:sldIdLst>
     <p:sldId id="261" r:id="rId2"/>
     <p:sldId id="262" r:id="rId3"/>
+    <p:sldId id="263" r:id="rId4"/>
+    <p:sldId id="264" r:id="rId5"/>
   </p:sldIdLst>
   <p:sldSz cx="9906000" cy="6858000" type="A4"/>
   <p:notesSz cx="6858000" cy="9144000"/>
@@ -124,6 +129,781 @@
 </p:presentation>
 </file>
 
+<file path=ppt/notesMasters/notesMaster1.xml><?xml version="1.0" encoding="utf-8"?>
+<p:notesMaster xmlns:a="http://schemas.openxmlformats.org/drawingml/2006/main" xmlns:r="http://schemas.openxmlformats.org/officeDocument/2006/relationships" xmlns:p="http://schemas.openxmlformats.org/presentationml/2006/main">
+  <p:cSld>
+    <p:bg>
+      <p:bgRef idx="1001">
+        <a:schemeClr val="bg1"/>
+      </p:bgRef>
+    </p:bg>
+    <p:spTree>
+      <p:nvGrpSpPr>
+        <p:cNvPr id="1" name=""/>
+        <p:cNvGrpSpPr/>
+        <p:nvPr/>
+      </p:nvGrpSpPr>
+      <p:grpSpPr>
+        <a:xfrm>
+          <a:off x="0" y="0"/>
+          <a:ext cx="0" cy="0"/>
+          <a:chOff x="0" y="0"/>
+          <a:chExt cx="0" cy="0"/>
+        </a:xfrm>
+      </p:grpSpPr>
+      <p:sp>
+        <p:nvSpPr>
+          <p:cNvPr id="2" name="Header Placeholder 1"/>
+          <p:cNvSpPr>
+            <a:spLocks noGrp="1"/>
+          </p:cNvSpPr>
+          <p:nvPr>
+            <p:ph type="hdr" sz="quarter"/>
+          </p:nvPr>
+        </p:nvSpPr>
+        <p:spPr>
+          <a:xfrm>
+            <a:off x="0" y="0"/>
+            <a:ext cx="2971800" cy="458788"/>
+          </a:xfrm>
+          <a:prstGeom prst="rect">
+            <a:avLst/>
+          </a:prstGeom>
+        </p:spPr>
+        <p:txBody>
+          <a:bodyPr vert="horz" lIns="91440" tIns="45720" rIns="91440" bIns="45720" rtlCol="0"/>
+          <a:lstStyle>
+            <a:lvl1pPr algn="l">
+              <a:defRPr sz="1200"/>
+            </a:lvl1pPr>
+          </a:lstStyle>
+          <a:p>
+            <a:endParaRPr lang="en-US"/>
+          </a:p>
+        </p:txBody>
+      </p:sp>
+      <p:sp>
+        <p:nvSpPr>
+          <p:cNvPr id="3" name="Date Placeholder 2"/>
+          <p:cNvSpPr>
+            <a:spLocks noGrp="1"/>
+          </p:cNvSpPr>
+          <p:nvPr>
+            <p:ph type="dt" idx="1"/>
+          </p:nvPr>
+        </p:nvSpPr>
+        <p:spPr>
+          <a:xfrm>
+            <a:off x="3884613" y="0"/>
+            <a:ext cx="2971800" cy="458788"/>
+          </a:xfrm>
+          <a:prstGeom prst="rect">
+            <a:avLst/>
+          </a:prstGeom>
+        </p:spPr>
+        <p:txBody>
+          <a:bodyPr vert="horz" lIns="91440" tIns="45720" rIns="91440" bIns="45720" rtlCol="0"/>
+          <a:lstStyle>
+            <a:lvl1pPr algn="r">
+              <a:defRPr sz="1200"/>
+            </a:lvl1pPr>
+          </a:lstStyle>
+          <a:p>
+            <a:fld id="{A1487AF8-2156-8B45-BDB5-173619DD143E}" type="datetimeFigureOut">
+              <a:rPr lang="en-US" smtClean="0"/>
+              <a:t>9/10/19</a:t>
+            </a:fld>
+            <a:endParaRPr lang="en-US"/>
+          </a:p>
+        </p:txBody>
+      </p:sp>
+      <p:sp>
+        <p:nvSpPr>
+          <p:cNvPr id="4" name="Slide Image Placeholder 3"/>
+          <p:cNvSpPr>
+            <a:spLocks noGrp="1" noRot="1" noChangeAspect="1"/>
+          </p:cNvSpPr>
+          <p:nvPr>
+            <p:ph type="sldImg" idx="2"/>
+          </p:nvPr>
+        </p:nvSpPr>
+        <p:spPr>
+          <a:xfrm>
+            <a:off x="1200150" y="1143000"/>
+            <a:ext cx="4457700" cy="3086100"/>
+          </a:xfrm>
+          <a:prstGeom prst="rect">
+            <a:avLst/>
+          </a:prstGeom>
+          <a:noFill/>
+          <a:ln w="12700">
+            <a:solidFill>
+              <a:prstClr val="black"/>
+            </a:solidFill>
+          </a:ln>
+        </p:spPr>
+        <p:txBody>
+          <a:bodyPr vert="horz" lIns="91440" tIns="45720" rIns="91440" bIns="45720" rtlCol="0" anchor="ctr"/>
+          <a:lstStyle/>
+          <a:p>
+            <a:endParaRPr lang="en-US"/>
+          </a:p>
+        </p:txBody>
+      </p:sp>
+      <p:sp>
+        <p:nvSpPr>
+          <p:cNvPr id="5" name="Notes Placeholder 4"/>
+          <p:cNvSpPr>
+            <a:spLocks noGrp="1"/>
+          </p:cNvSpPr>
+          <p:nvPr>
+            <p:ph type="body" sz="quarter" idx="3"/>
+          </p:nvPr>
+        </p:nvSpPr>
+        <p:spPr>
+          <a:xfrm>
+            <a:off x="685800" y="4400550"/>
+            <a:ext cx="5486400" cy="3600450"/>
+          </a:xfrm>
+          <a:prstGeom prst="rect">
+            <a:avLst/>
+          </a:prstGeom>
+        </p:spPr>
+        <p:txBody>
+          <a:bodyPr vert="horz" lIns="91440" tIns="45720" rIns="91440" bIns="45720" rtlCol="0"/>
+          <a:lstStyle/>
+          <a:p>
+            <a:pPr lvl="0"/>
+            <a:r>
+              <a:rPr lang="en-GB"/>
+              <a:t>Click to edit Master text styles</a:t>
+            </a:r>
+          </a:p>
+          <a:p>
+            <a:pPr lvl="1"/>
+            <a:r>
+              <a:rPr lang="en-GB"/>
+              <a:t>Second level</a:t>
+            </a:r>
+          </a:p>
+          <a:p>
+            <a:pPr lvl="2"/>
+            <a:r>
+              <a:rPr lang="en-GB"/>
+              <a:t>Third level</a:t>
+            </a:r>
+          </a:p>
+          <a:p>
+            <a:pPr lvl="3"/>
+            <a:r>
+              <a:rPr lang="en-GB"/>
+              <a:t>Fourth level</a:t>
+            </a:r>
+          </a:p>
+          <a:p>
+            <a:pPr lvl="4"/>
+            <a:r>
+              <a:rPr lang="en-GB"/>
+              <a:t>Fifth level</a:t>
+            </a:r>
+            <a:endParaRPr lang="en-US"/>
+          </a:p>
+        </p:txBody>
+      </p:sp>
+      <p:sp>
+        <p:nvSpPr>
+          <p:cNvPr id="6" name="Footer Placeholder 5"/>
+          <p:cNvSpPr>
+            <a:spLocks noGrp="1"/>
+          </p:cNvSpPr>
+          <p:nvPr>
+            <p:ph type="ftr" sz="quarter" idx="4"/>
+          </p:nvPr>
+        </p:nvSpPr>
+        <p:spPr>
+          <a:xfrm>
+            <a:off x="0" y="8685213"/>
+            <a:ext cx="2971800" cy="458787"/>
+          </a:xfrm>
+          <a:prstGeom prst="rect">
+            <a:avLst/>
+          </a:prstGeom>
+        </p:spPr>
+        <p:txBody>
+          <a:bodyPr vert="horz" lIns="91440" tIns="45720" rIns="91440" bIns="45720" rtlCol="0" anchor="b"/>
+          <a:lstStyle>
+            <a:lvl1pPr algn="l">
+              <a:defRPr sz="1200"/>
+            </a:lvl1pPr>
+          </a:lstStyle>
+          <a:p>
+            <a:endParaRPr lang="en-US"/>
+          </a:p>
+        </p:txBody>
+      </p:sp>
+      <p:sp>
+        <p:nvSpPr>
+          <p:cNvPr id="7" name="Slide Number Placeholder 6"/>
+          <p:cNvSpPr>
+            <a:spLocks noGrp="1"/>
+          </p:cNvSpPr>
+          <p:nvPr>
+            <p:ph type="sldNum" sz="quarter" idx="5"/>
+          </p:nvPr>
+        </p:nvSpPr>
+        <p:spPr>
+          <a:xfrm>
+            <a:off x="3884613" y="8685213"/>
+            <a:ext cx="2971800" cy="458787"/>
+          </a:xfrm>
+          <a:prstGeom prst="rect">
+            <a:avLst/>
+          </a:prstGeom>
+        </p:spPr>
+        <p:txBody>
+          <a:bodyPr vert="horz" lIns="91440" tIns="45720" rIns="91440" bIns="45720" rtlCol="0" anchor="b"/>
+          <a:lstStyle>
+            <a:lvl1pPr algn="r">
+              <a:defRPr sz="1200"/>
+            </a:lvl1pPr>
+          </a:lstStyle>
+          <a:p>
+            <a:fld id="{FBF91155-D4F6-7A44-9B55-E2E73613D85E}" type="slidenum">
+              <a:rPr lang="en-US" smtClean="0"/>
+              <a:t>‹#›</a:t>
+            </a:fld>
+            <a:endParaRPr lang="en-US"/>
+          </a:p>
+        </p:txBody>
+      </p:sp>
+    </p:spTree>
+    <p:extLst>
+      <p:ext uri="{BB962C8B-B14F-4D97-AF65-F5344CB8AC3E}">
+        <p14:creationId xmlns:p14="http://schemas.microsoft.com/office/powerpoint/2010/main" val="2334093853"/>
+      </p:ext>
+    </p:extLst>
+  </p:cSld>
+  <p:clrMap bg1="lt1" tx1="dk1" bg2="lt2" tx2="dk2" accent1="accent1" accent2="accent2" accent3="accent3" accent4="accent4" accent5="accent5" accent6="accent6" hlink="hlink" folHlink="folHlink"/>
+  <p:notesStyle>
+    <a:lvl1pPr marL="0" algn="l" defTabSz="914400" rtl="0" eaLnBrk="1" latinLnBrk="0" hangingPunct="1">
+      <a:defRPr sz="1200" kern="1200">
+        <a:solidFill>
+          <a:schemeClr val="tx1"/>
+        </a:solidFill>
+        <a:latin typeface="+mn-lt"/>
+        <a:ea typeface="+mn-ea"/>
+        <a:cs typeface="+mn-cs"/>
+      </a:defRPr>
+    </a:lvl1pPr>
+    <a:lvl2pPr marL="457200" algn="l" defTabSz="914400" rtl="0" eaLnBrk="1" latinLnBrk="0" hangingPunct="1">
+      <a:defRPr sz="1200" kern="1200">
+        <a:solidFill>
+          <a:schemeClr val="tx1"/>
+        </a:solidFill>
+        <a:latin typeface="+mn-lt"/>
+        <a:ea typeface="+mn-ea"/>
+        <a:cs typeface="+mn-cs"/>
+      </a:defRPr>
+    </a:lvl2pPr>
+    <a:lvl3pPr marL="914400" algn="l" defTabSz="914400" rtl="0" eaLnBrk="1" latinLnBrk="0" hangingPunct="1">
+      <a:defRPr sz="1200" kern="1200">
+        <a:solidFill>
+          <a:schemeClr val="tx1"/>
+        </a:solidFill>
+        <a:latin typeface="+mn-lt"/>
+        <a:ea typeface="+mn-ea"/>
+        <a:cs typeface="+mn-cs"/>
+      </a:defRPr>
+    </a:lvl3pPr>
+    <a:lvl4pPr marL="1371600" algn="l" defTabSz="914400" rtl="0" eaLnBrk="1" latinLnBrk="0" hangingPunct="1">
+      <a:defRPr sz="1200" kern="1200">
+        <a:solidFill>
+          <a:schemeClr val="tx1"/>
+        </a:solidFill>
+        <a:latin typeface="+mn-lt"/>
+        <a:ea typeface="+mn-ea"/>
+        <a:cs typeface="+mn-cs"/>
+      </a:defRPr>
+    </a:lvl4pPr>
+    <a:lvl5pPr marL="1828800" algn="l" defTabSz="914400" rtl="0" eaLnBrk="1" latinLnBrk="0" hangingPunct="1">
+      <a:defRPr sz="1200" kern="1200">
+        <a:solidFill>
+          <a:schemeClr val="tx1"/>
+        </a:solidFill>
+        <a:latin typeface="+mn-lt"/>
+        <a:ea typeface="+mn-ea"/>
+        <a:cs typeface="+mn-cs"/>
+      </a:defRPr>
+    </a:lvl5pPr>
+    <a:lvl6pPr marL="2286000" algn="l" defTabSz="914400" rtl="0" eaLnBrk="1" latinLnBrk="0" hangingPunct="1">
+      <a:defRPr sz="1200" kern="1200">
+        <a:solidFill>
+          <a:schemeClr val="tx1"/>
+        </a:solidFill>
+        <a:latin typeface="+mn-lt"/>
+        <a:ea typeface="+mn-ea"/>
+        <a:cs typeface="+mn-cs"/>
+      </a:defRPr>
+    </a:lvl6pPr>
+    <a:lvl7pPr marL="2743200" algn="l" defTabSz="914400" rtl="0" eaLnBrk="1" latinLnBrk="0" hangingPunct="1">
+      <a:defRPr sz="1200" kern="1200">
+        <a:solidFill>
+          <a:schemeClr val="tx1"/>
+        </a:solidFill>
+        <a:latin typeface="+mn-lt"/>
+        <a:ea typeface="+mn-ea"/>
+        <a:cs typeface="+mn-cs"/>
+      </a:defRPr>
+    </a:lvl7pPr>
+    <a:lvl8pPr marL="3200400" algn="l" defTabSz="914400" rtl="0" eaLnBrk="1" latinLnBrk="0" hangingPunct="1">
+      <a:defRPr sz="1200" kern="1200">
+        <a:solidFill>
+          <a:schemeClr val="tx1"/>
+        </a:solidFill>
+        <a:latin typeface="+mn-lt"/>
+        <a:ea typeface="+mn-ea"/>
+        <a:cs typeface="+mn-cs"/>
+      </a:defRPr>
+    </a:lvl8pPr>
+    <a:lvl9pPr marL="3657600" algn="l" defTabSz="914400" rtl="0" eaLnBrk="1" latinLnBrk="0" hangingPunct="1">
+      <a:defRPr sz="1200" kern="1200">
+        <a:solidFill>
+          <a:schemeClr val="tx1"/>
+        </a:solidFill>
+        <a:latin typeface="+mn-lt"/>
+        <a:ea typeface="+mn-ea"/>
+        <a:cs typeface="+mn-cs"/>
+      </a:defRPr>
+    </a:lvl9pPr>
+  </p:notesStyle>
+</p:notesMaster>
+</file>
+
+<file path=ppt/notesSlides/notesSlide1.xml><?xml version="1.0" encoding="utf-8"?>
+<p:notes xmlns:a="http://schemas.openxmlformats.org/drawingml/2006/main" xmlns:r="http://schemas.openxmlformats.org/officeDocument/2006/relationships" xmlns:p="http://schemas.openxmlformats.org/presentationml/2006/main">
+  <p:cSld>
+    <p:spTree>
+      <p:nvGrpSpPr>
+        <p:cNvPr id="1" name=""/>
+        <p:cNvGrpSpPr/>
+        <p:nvPr/>
+      </p:nvGrpSpPr>
+      <p:grpSpPr>
+        <a:xfrm>
+          <a:off x="0" y="0"/>
+          <a:ext cx="0" cy="0"/>
+          <a:chOff x="0" y="0"/>
+          <a:chExt cx="0" cy="0"/>
+        </a:xfrm>
+      </p:grpSpPr>
+      <p:sp>
+        <p:nvSpPr>
+          <p:cNvPr id="2" name="Slide Image Placeholder 1"/>
+          <p:cNvSpPr>
+            <a:spLocks noGrp="1" noRot="1" noChangeAspect="1"/>
+          </p:cNvSpPr>
+          <p:nvPr>
+            <p:ph type="sldImg"/>
+          </p:nvPr>
+        </p:nvSpPr>
+        <p:spPr/>
+      </p:sp>
+      <p:sp>
+        <p:nvSpPr>
+          <p:cNvPr id="3" name="Notes Placeholder 2"/>
+          <p:cNvSpPr>
+            <a:spLocks noGrp="1"/>
+          </p:cNvSpPr>
+          <p:nvPr>
+            <p:ph type="body" idx="1"/>
+          </p:nvPr>
+        </p:nvSpPr>
+        <p:spPr/>
+        <p:txBody>
+          <a:bodyPr/>
+          <a:lstStyle/>
+          <a:p>
+            <a:pPr marL="0" marR="0" lvl="0" indent="0" algn="l" defTabSz="914400" rtl="0" eaLnBrk="1" fontAlgn="auto" latinLnBrk="0" hangingPunct="1">
+              <a:lnSpc>
+                <a:spcPct val="100000"/>
+              </a:lnSpc>
+              <a:spcBef>
+                <a:spcPts val="0"/>
+              </a:spcBef>
+              <a:spcAft>
+                <a:spcPts val="0"/>
+              </a:spcAft>
+              <a:buClrTx/>
+              <a:buSzTx/>
+              <a:buFontTx/>
+              <a:buNone/>
+              <a:tabLst/>
+              <a:defRPr/>
+            </a:pPr>
+            <a:r>
+              <a:rPr kumimoji="0" lang="en-GB" sz="1200" b="1" i="0" u="none" strike="noStrike" kern="1200" cap="none" spc="0" normalizeH="0" baseline="0" noProof="0" dirty="0">
+                <a:ln>
+                  <a:noFill/>
+                </a:ln>
+                <a:solidFill>
+                  <a:prstClr val="black"/>
+                </a:solidFill>
+                <a:effectLst/>
+                <a:uLnTx/>
+                <a:uFillTx/>
+                <a:latin typeface="Arial" panose="020B0604020202020204" pitchFamily="34" charset="0"/>
+                <a:ea typeface="+mn-ea"/>
+                <a:cs typeface="Arial" panose="020B0604020202020204" pitchFamily="34" charset="0"/>
+              </a:rPr>
+              <a:t>Figure S1.  </a:t>
+            </a:r>
+            <a:r>
+              <a:rPr kumimoji="0" lang="en-GB" sz="1200" b="0" i="0" u="none" strike="noStrike" kern="1200" cap="none" spc="0" normalizeH="0" baseline="0" noProof="0" dirty="0">
+                <a:ln>
+                  <a:noFill/>
+                </a:ln>
+                <a:solidFill>
+                  <a:prstClr val="black"/>
+                </a:solidFill>
+                <a:effectLst/>
+                <a:uLnTx/>
+                <a:uFillTx/>
+                <a:latin typeface="Arial" panose="020B0604020202020204" pitchFamily="34" charset="0"/>
+                <a:ea typeface="+mn-ea"/>
+                <a:cs typeface="Arial" panose="020B0604020202020204" pitchFamily="34" charset="0"/>
+              </a:rPr>
+              <a:t>Principal component analysis (PCA)-based clustering plot, and heatmap plot using RNA-sequencing data from perirenal adipose tissue taken from Sham and thyroidectomised (TX) </a:t>
+            </a:r>
+            <a:r>
+              <a:rPr kumimoji="0" lang="en-GB" sz="1200" b="0" i="0" u="none" strike="noStrike" kern="1200" cap="none" spc="0" normalizeH="0" baseline="0" noProof="0" dirty="0" err="1">
+                <a:ln>
+                  <a:noFill/>
+                </a:ln>
+                <a:solidFill>
+                  <a:prstClr val="black"/>
+                </a:solidFill>
+                <a:effectLst/>
+                <a:uLnTx/>
+                <a:uFillTx/>
+                <a:latin typeface="Arial" panose="020B0604020202020204" pitchFamily="34" charset="0"/>
+                <a:ea typeface="+mn-ea"/>
+                <a:cs typeface="Arial" panose="020B0604020202020204" pitchFamily="34" charset="0"/>
+              </a:rPr>
+              <a:t>fetuses</a:t>
+            </a:r>
+            <a:r>
+              <a:rPr kumimoji="0" lang="en-GB" sz="1200" b="0" i="0" u="none" strike="noStrike" kern="1200" cap="none" spc="0" normalizeH="0" baseline="0" noProof="0" dirty="0">
+                <a:ln>
+                  <a:noFill/>
+                </a:ln>
+                <a:solidFill>
+                  <a:prstClr val="black"/>
+                </a:solidFill>
+                <a:effectLst/>
+                <a:uLnTx/>
+                <a:uFillTx/>
+                <a:latin typeface="Arial" panose="020B0604020202020204" pitchFamily="34" charset="0"/>
+                <a:ea typeface="+mn-ea"/>
+                <a:cs typeface="Arial" panose="020B0604020202020204" pitchFamily="34" charset="0"/>
+              </a:rPr>
+              <a:t> at 129 and 143 days of gestation (</a:t>
+            </a:r>
+            <a:r>
+              <a:rPr kumimoji="0" lang="en-GB" sz="1200" b="0" i="0" u="none" strike="noStrike" kern="1200" cap="none" spc="0" normalizeH="0" baseline="0" noProof="0" dirty="0" err="1">
+                <a:ln>
+                  <a:noFill/>
+                </a:ln>
+                <a:solidFill>
+                  <a:prstClr val="black"/>
+                </a:solidFill>
+                <a:effectLst/>
+                <a:uLnTx/>
+                <a:uFillTx/>
+                <a:latin typeface="Arial" panose="020B0604020202020204" pitchFamily="34" charset="0"/>
+                <a:ea typeface="+mn-ea"/>
+                <a:cs typeface="Arial" panose="020B0604020202020204" pitchFamily="34" charset="0"/>
+              </a:rPr>
+              <a:t>dGA</a:t>
+            </a:r>
+            <a:r>
+              <a:rPr kumimoji="0" lang="en-GB" sz="1200" b="0" i="0" u="none" strike="noStrike" kern="1200" cap="none" spc="0" normalizeH="0" baseline="0" noProof="0" dirty="0">
+                <a:ln>
+                  <a:noFill/>
+                </a:ln>
+                <a:solidFill>
+                  <a:prstClr val="black"/>
+                </a:solidFill>
+                <a:effectLst/>
+                <a:uLnTx/>
+                <a:uFillTx/>
+                <a:latin typeface="Arial" panose="020B0604020202020204" pitchFamily="34" charset="0"/>
+                <a:ea typeface="+mn-ea"/>
+                <a:cs typeface="Arial" panose="020B0604020202020204" pitchFamily="34" charset="0"/>
+              </a:rPr>
+              <a:t>).  (A) Unbiased PCA-based clustering of treatment (TX and Sham) with gestational age (129 and 143 </a:t>
+            </a:r>
+            <a:r>
+              <a:rPr kumimoji="0" lang="en-GB" sz="1200" b="0" i="0" u="none" strike="noStrike" kern="1200" cap="none" spc="0" normalizeH="0" baseline="0" noProof="0" dirty="0" err="1">
+                <a:ln>
+                  <a:noFill/>
+                </a:ln>
+                <a:solidFill>
+                  <a:prstClr val="black"/>
+                </a:solidFill>
+                <a:effectLst/>
+                <a:uLnTx/>
+                <a:uFillTx/>
+                <a:latin typeface="Arial" panose="020B0604020202020204" pitchFamily="34" charset="0"/>
+                <a:ea typeface="+mn-ea"/>
+                <a:cs typeface="Arial" panose="020B0604020202020204" pitchFamily="34" charset="0"/>
+              </a:rPr>
+              <a:t>dGA</a:t>
+            </a:r>
+            <a:r>
+              <a:rPr kumimoji="0" lang="en-GB" sz="1200" b="0" i="0" u="none" strike="noStrike" kern="1200" cap="none" spc="0" normalizeH="0" baseline="0" noProof="0" dirty="0">
+                <a:ln>
+                  <a:noFill/>
+                </a:ln>
+                <a:solidFill>
+                  <a:prstClr val="black"/>
+                </a:solidFill>
+                <a:effectLst/>
+                <a:uLnTx/>
+                <a:uFillTx/>
+                <a:latin typeface="Arial" panose="020B0604020202020204" pitchFamily="34" charset="0"/>
+                <a:ea typeface="+mn-ea"/>
+                <a:cs typeface="Arial" panose="020B0604020202020204" pitchFamily="34" charset="0"/>
+              </a:rPr>
+              <a:t>).  The 500 most variable genes and the two principal components were used for clustering and to describe the variance between the subsets. (B) </a:t>
+            </a:r>
+            <a:r>
+              <a:rPr kumimoji="0" lang="en-US" sz="1200" b="0" i="0" u="none" strike="noStrike" kern="1200" cap="none" spc="0" normalizeH="0" baseline="0" noProof="0" dirty="0">
+                <a:ln>
+                  <a:noFill/>
+                </a:ln>
+                <a:solidFill>
+                  <a:prstClr val="black"/>
+                </a:solidFill>
+                <a:effectLst/>
+                <a:uLnTx/>
+                <a:uFillTx/>
+                <a:latin typeface="Arial" panose="020B0604020202020204" pitchFamily="34" charset="0"/>
+                <a:ea typeface="+mn-ea"/>
+                <a:cs typeface="Arial" panose="020B0604020202020204" pitchFamily="34" charset="0"/>
+              </a:rPr>
+              <a:t>Top 25 genes that explain the variance by treatment (TX and sham) within PC1.  (C) Top 25 genes that explain the variance by gestational age (129 and 143 </a:t>
+            </a:r>
+            <a:r>
+              <a:rPr kumimoji="0" lang="en-US" sz="1200" b="0" i="0" u="none" strike="noStrike" kern="1200" cap="none" spc="0" normalizeH="0" baseline="0" noProof="0" dirty="0" err="1">
+                <a:ln>
+                  <a:noFill/>
+                </a:ln>
+                <a:solidFill>
+                  <a:prstClr val="black"/>
+                </a:solidFill>
+                <a:effectLst/>
+                <a:uLnTx/>
+                <a:uFillTx/>
+                <a:latin typeface="Arial" panose="020B0604020202020204" pitchFamily="34" charset="0"/>
+                <a:ea typeface="+mn-ea"/>
+                <a:cs typeface="Arial" panose="020B0604020202020204" pitchFamily="34" charset="0"/>
+              </a:rPr>
+              <a:t>dGA</a:t>
+            </a:r>
+            <a:r>
+              <a:rPr kumimoji="0" lang="en-US" sz="1200" b="0" i="0" u="none" strike="noStrike" kern="1200" cap="none" spc="0" normalizeH="0" baseline="0" noProof="0" dirty="0">
+                <a:ln>
+                  <a:noFill/>
+                </a:ln>
+                <a:solidFill>
+                  <a:prstClr val="black"/>
+                </a:solidFill>
+                <a:effectLst/>
+                <a:uLnTx/>
+                <a:uFillTx/>
+                <a:latin typeface="Arial" panose="020B0604020202020204" pitchFamily="34" charset="0"/>
+                <a:ea typeface="+mn-ea"/>
+                <a:cs typeface="Arial" panose="020B0604020202020204" pitchFamily="34" charset="0"/>
+              </a:rPr>
+              <a:t>) within PC2. </a:t>
+            </a:r>
+            <a:r>
+              <a:rPr kumimoji="0" lang="en-GB" sz="1200" b="0" i="0" u="none" strike="noStrike" kern="1200" cap="none" spc="0" normalizeH="0" baseline="0" noProof="0" dirty="0">
+                <a:ln>
+                  <a:noFill/>
+                </a:ln>
+                <a:solidFill>
+                  <a:prstClr val="black"/>
+                </a:solidFill>
+                <a:effectLst/>
+                <a:uLnTx/>
+                <a:uFillTx/>
+                <a:latin typeface="Arial" panose="020B0604020202020204" pitchFamily="34" charset="0"/>
+                <a:ea typeface="+mn-ea"/>
+                <a:cs typeface="Arial" panose="020B0604020202020204" pitchFamily="34" charset="0"/>
+              </a:rPr>
+              <a:t>(D) Hierarchical clustering heatmap analysis for the top 262 genes under the DESeq2 comparison by treatment with absolute log2 fold change &gt;= 2 and </a:t>
+            </a:r>
+            <a:r>
+              <a:rPr kumimoji="0" lang="en-GB" sz="1200" b="0" i="0" u="none" strike="noStrike" kern="1200" cap="none" spc="0" normalizeH="0" baseline="0" noProof="0" dirty="0" err="1">
+                <a:ln>
+                  <a:noFill/>
+                </a:ln>
+                <a:solidFill>
+                  <a:prstClr val="black"/>
+                </a:solidFill>
+                <a:effectLst/>
+                <a:uLnTx/>
+                <a:uFillTx/>
+                <a:latin typeface="Arial" panose="020B0604020202020204" pitchFamily="34" charset="0"/>
+                <a:ea typeface="+mn-ea"/>
+                <a:cs typeface="Arial" panose="020B0604020202020204" pitchFamily="34" charset="0"/>
+              </a:rPr>
+              <a:t>Padj</a:t>
+            </a:r>
+            <a:r>
+              <a:rPr kumimoji="0" lang="en-GB" sz="1200" b="0" i="0" u="none" strike="noStrike" kern="1200" cap="none" spc="0" normalizeH="0" baseline="0" noProof="0" dirty="0">
+                <a:ln>
+                  <a:noFill/>
+                </a:ln>
+                <a:solidFill>
+                  <a:prstClr val="black"/>
+                </a:solidFill>
+                <a:effectLst/>
+                <a:uLnTx/>
+                <a:uFillTx/>
+                <a:latin typeface="Arial" panose="020B0604020202020204" pitchFamily="34" charset="0"/>
+                <a:ea typeface="+mn-ea"/>
+                <a:cs typeface="Arial" panose="020B0604020202020204" pitchFamily="34" charset="0"/>
+              </a:rPr>
+              <a:t> &lt; 0.05. </a:t>
+            </a:r>
+          </a:p>
+          <a:p>
+            <a:endParaRPr lang="en-US" dirty="0"/>
+          </a:p>
+        </p:txBody>
+      </p:sp>
+      <p:sp>
+        <p:nvSpPr>
+          <p:cNvPr id="4" name="Slide Number Placeholder 3"/>
+          <p:cNvSpPr>
+            <a:spLocks noGrp="1"/>
+          </p:cNvSpPr>
+          <p:nvPr>
+            <p:ph type="sldNum" sz="quarter" idx="5"/>
+          </p:nvPr>
+        </p:nvSpPr>
+        <p:spPr/>
+        <p:txBody>
+          <a:bodyPr/>
+          <a:lstStyle/>
+          <a:p>
+            <a:fld id="{FBF91155-D4F6-7A44-9B55-E2E73613D85E}" type="slidenum">
+              <a:rPr lang="en-US" smtClean="0"/>
+              <a:t>3</a:t>
+            </a:fld>
+            <a:endParaRPr lang="en-US"/>
+          </a:p>
+        </p:txBody>
+      </p:sp>
+    </p:spTree>
+    <p:extLst>
+      <p:ext uri="{BB962C8B-B14F-4D97-AF65-F5344CB8AC3E}">
+        <p14:creationId xmlns:p14="http://schemas.microsoft.com/office/powerpoint/2010/main" val="53719605"/>
+      </p:ext>
+    </p:extLst>
+  </p:cSld>
+  <p:clrMapOvr>
+    <a:masterClrMapping/>
+  </p:clrMapOvr>
+</p:notes>
+</file>
+
+<file path=ppt/notesSlides/notesSlide2.xml><?xml version="1.0" encoding="utf-8"?>
+<p:notes xmlns:a="http://schemas.openxmlformats.org/drawingml/2006/main" xmlns:r="http://schemas.openxmlformats.org/officeDocument/2006/relationships" xmlns:p="http://schemas.openxmlformats.org/presentationml/2006/main">
+  <p:cSld>
+    <p:spTree>
+      <p:nvGrpSpPr>
+        <p:cNvPr id="1" name=""/>
+        <p:cNvGrpSpPr/>
+        <p:nvPr/>
+      </p:nvGrpSpPr>
+      <p:grpSpPr>
+        <a:xfrm>
+          <a:off x="0" y="0"/>
+          <a:ext cx="0" cy="0"/>
+          <a:chOff x="0" y="0"/>
+          <a:chExt cx="0" cy="0"/>
+        </a:xfrm>
+      </p:grpSpPr>
+      <p:sp>
+        <p:nvSpPr>
+          <p:cNvPr id="2" name="Slide Image Placeholder 1"/>
+          <p:cNvSpPr>
+            <a:spLocks noGrp="1" noRot="1" noChangeAspect="1"/>
+          </p:cNvSpPr>
+          <p:nvPr>
+            <p:ph type="sldImg"/>
+          </p:nvPr>
+        </p:nvSpPr>
+        <p:spPr/>
+      </p:sp>
+      <p:sp>
+        <p:nvSpPr>
+          <p:cNvPr id="3" name="Notes Placeholder 2"/>
+          <p:cNvSpPr>
+            <a:spLocks noGrp="1"/>
+          </p:cNvSpPr>
+          <p:nvPr>
+            <p:ph type="body" idx="1"/>
+          </p:nvPr>
+        </p:nvSpPr>
+        <p:spPr/>
+        <p:txBody>
+          <a:bodyPr/>
+          <a:lstStyle/>
+          <a:p>
+            <a:endParaRPr lang="en-US" dirty="0"/>
+          </a:p>
+        </p:txBody>
+      </p:sp>
+      <p:sp>
+        <p:nvSpPr>
+          <p:cNvPr id="4" name="Slide Number Placeholder 3"/>
+          <p:cNvSpPr>
+            <a:spLocks noGrp="1"/>
+          </p:cNvSpPr>
+          <p:nvPr>
+            <p:ph type="sldNum" sz="quarter" idx="5"/>
+          </p:nvPr>
+        </p:nvSpPr>
+        <p:spPr/>
+        <p:txBody>
+          <a:bodyPr/>
+          <a:lstStyle/>
+          <a:p>
+            <a:fld id="{FBF91155-D4F6-7A44-9B55-E2E73613D85E}" type="slidenum">
+              <a:rPr lang="en-US" smtClean="0"/>
+              <a:t>4</a:t>
+            </a:fld>
+            <a:endParaRPr lang="en-US"/>
+          </a:p>
+        </p:txBody>
+      </p:sp>
+    </p:spTree>
+    <p:extLst>
+      <p:ext uri="{BB962C8B-B14F-4D97-AF65-F5344CB8AC3E}">
+        <p14:creationId xmlns:p14="http://schemas.microsoft.com/office/powerpoint/2010/main" val="2503625654"/>
+      </p:ext>
+    </p:extLst>
+  </p:cSld>
+  <p:clrMapOvr>
+    <a:masterClrMapping/>
+  </p:clrMapOvr>
+</p:notes>
+</file>
+
 <file path=ppt/slideLayouts/slideLayout1.xml><?xml version="1.0" encoding="utf-8"?>
 <p:sldLayout xmlns:a="http://schemas.openxmlformats.org/drawingml/2006/main" xmlns:r="http://schemas.openxmlformats.org/officeDocument/2006/relationships" xmlns:p="http://schemas.openxmlformats.org/presentationml/2006/main" type="title" preserve="1">
   <p:cSld name="Title Slide">
@@ -306,7 +1086,7 @@
             <a:fld id="{7EBC45F2-54EB-4991-95D1-E21CADDE3ABA}" type="datetimeFigureOut">
               <a:rPr lang="en-GB" smtClean="0"/>
               <a:pPr/>
-              <a:t>13/08/2019</a:t>
+              <a:t>10/09/2019</a:t>
             </a:fld>
             <a:endParaRPr lang="en-GB"/>
           </a:p>
@@ -478,7 +1258,7 @@
             <a:fld id="{7EBC45F2-54EB-4991-95D1-E21CADDE3ABA}" type="datetimeFigureOut">
               <a:rPr lang="en-GB" smtClean="0"/>
               <a:pPr/>
-              <a:t>13/08/2019</a:t>
+              <a:t>10/09/2019</a:t>
             </a:fld>
             <a:endParaRPr lang="en-GB"/>
           </a:p>
@@ -660,7 +1440,7 @@
             <a:fld id="{7EBC45F2-54EB-4991-95D1-E21CADDE3ABA}" type="datetimeFigureOut">
               <a:rPr lang="en-GB" smtClean="0"/>
               <a:pPr/>
-              <a:t>13/08/2019</a:t>
+              <a:t>10/09/2019</a:t>
             </a:fld>
             <a:endParaRPr lang="en-GB"/>
           </a:p>
@@ -832,7 +1612,7 @@
             <a:fld id="{7EBC45F2-54EB-4991-95D1-E21CADDE3ABA}" type="datetimeFigureOut">
               <a:rPr lang="en-GB" smtClean="0"/>
               <a:pPr/>
-              <a:t>13/08/2019</a:t>
+              <a:t>10/09/2019</a:t>
             </a:fld>
             <a:endParaRPr lang="en-GB"/>
           </a:p>
@@ -1080,7 +1860,7 @@
             <a:fld id="{7EBC45F2-54EB-4991-95D1-E21CADDE3ABA}" type="datetimeFigureOut">
               <a:rPr lang="en-GB" smtClean="0"/>
               <a:pPr/>
-              <a:t>13/08/2019</a:t>
+              <a:t>10/09/2019</a:t>
             </a:fld>
             <a:endParaRPr lang="en-GB"/>
           </a:p>
@@ -1370,7 +2150,7 @@
             <a:fld id="{7EBC45F2-54EB-4991-95D1-E21CADDE3ABA}" type="datetimeFigureOut">
               <a:rPr lang="en-GB" smtClean="0"/>
               <a:pPr/>
-              <a:t>13/08/2019</a:t>
+              <a:t>10/09/2019</a:t>
             </a:fld>
             <a:endParaRPr lang="en-GB"/>
           </a:p>
@@ -1799,7 +2579,7 @@
             <a:fld id="{7EBC45F2-54EB-4991-95D1-E21CADDE3ABA}" type="datetimeFigureOut">
               <a:rPr lang="en-GB" smtClean="0"/>
               <a:pPr/>
-              <a:t>13/08/2019</a:t>
+              <a:t>10/09/2019</a:t>
             </a:fld>
             <a:endParaRPr lang="en-GB"/>
           </a:p>
@@ -1919,7 +2699,7 @@
             <a:fld id="{7EBC45F2-54EB-4991-95D1-E21CADDE3ABA}" type="datetimeFigureOut">
               <a:rPr lang="en-GB" smtClean="0"/>
               <a:pPr/>
-              <a:t>13/08/2019</a:t>
+              <a:t>10/09/2019</a:t>
             </a:fld>
             <a:endParaRPr lang="en-GB"/>
           </a:p>
@@ -2016,7 +2796,7 @@
             <a:fld id="{7EBC45F2-54EB-4991-95D1-E21CADDE3ABA}" type="datetimeFigureOut">
               <a:rPr lang="en-GB" smtClean="0"/>
               <a:pPr/>
-              <a:t>13/08/2019</a:t>
+              <a:t>10/09/2019</a:t>
             </a:fld>
             <a:endParaRPr lang="en-GB"/>
           </a:p>
@@ -2295,7 +3075,7 @@
             <a:fld id="{7EBC45F2-54EB-4991-95D1-E21CADDE3ABA}" type="datetimeFigureOut">
               <a:rPr lang="en-GB" smtClean="0"/>
               <a:pPr/>
-              <a:t>13/08/2019</a:t>
+              <a:t>10/09/2019</a:t>
             </a:fld>
             <a:endParaRPr lang="en-GB"/>
           </a:p>
@@ -2550,7 +3330,7 @@
             <a:fld id="{7EBC45F2-54EB-4991-95D1-E21CADDE3ABA}" type="datetimeFigureOut">
               <a:rPr lang="en-GB" smtClean="0"/>
               <a:pPr/>
-              <a:t>13/08/2019</a:t>
+              <a:t>10/09/2019</a:t>
             </a:fld>
             <a:endParaRPr lang="en-GB"/>
           </a:p>
@@ -2765,7 +3545,7 @@
             <a:fld id="{7EBC45F2-54EB-4991-95D1-E21CADDE3ABA}" type="datetimeFigureOut">
               <a:rPr lang="en-GB" smtClean="0"/>
               <a:pPr/>
-              <a:t>13/08/2019</a:t>
+              <a:t>10/09/2019</a:t>
             </a:fld>
             <a:endParaRPr lang="en-GB"/>
           </a:p>
@@ -3168,7 +3948,7 @@
         </p:blipFill>
         <p:spPr>
           <a:xfrm>
-            <a:off x="5792997" y="177943"/>
+            <a:off x="5843634" y="200152"/>
             <a:ext cx="3923709" cy="5199011"/>
           </a:xfrm>
           <a:prstGeom prst="rect">
@@ -3255,7 +4035,7 @@
         </p:nvGrpSpPr>
         <p:grpSpPr>
           <a:xfrm>
-            <a:off x="322208" y="17547"/>
+            <a:off x="289595" y="0"/>
             <a:ext cx="3648892" cy="3103017"/>
             <a:chOff x="608588" y="292460"/>
             <a:chExt cx="3806657" cy="3442061"/>
@@ -4100,7 +4880,7 @@
         </p:nvGrpSpPr>
         <p:grpSpPr>
           <a:xfrm>
-            <a:off x="5018303" y="151363"/>
+            <a:off x="5018303" y="165897"/>
             <a:ext cx="4673002" cy="3112069"/>
             <a:chOff x="5232998" y="353261"/>
             <a:chExt cx="4389120" cy="2743200"/>
@@ -4241,7 +5021,7 @@
         </p:nvGrpSpPr>
         <p:grpSpPr>
           <a:xfrm>
-            <a:off x="259128" y="166267"/>
+            <a:off x="255595" y="165897"/>
             <a:ext cx="4673002" cy="3112069"/>
             <a:chOff x="460245" y="457465"/>
             <a:chExt cx="4389120" cy="2743200"/>
@@ -4820,6 +5600,1025 @@
     <p:extLst>
       <p:ext uri="{BB962C8B-B14F-4D97-AF65-F5344CB8AC3E}">
         <p14:creationId xmlns:p14="http://schemas.microsoft.com/office/powerpoint/2010/main" val="463313512"/>
+      </p:ext>
+    </p:extLst>
+  </p:cSld>
+  <p:clrMapOvr>
+    <a:masterClrMapping/>
+  </p:clrMapOvr>
+</p:sld>
+</file>
+
+<file path=ppt/slides/slide3.xml><?xml version="1.0" encoding="utf-8"?>
+<p:sld xmlns:a="http://schemas.openxmlformats.org/drawingml/2006/main" xmlns:r="http://schemas.openxmlformats.org/officeDocument/2006/relationships" xmlns:p="http://schemas.openxmlformats.org/presentationml/2006/main">
+  <p:cSld>
+    <p:spTree>
+      <p:nvGrpSpPr>
+        <p:cNvPr id="1" name=""/>
+        <p:cNvGrpSpPr/>
+        <p:nvPr/>
+      </p:nvGrpSpPr>
+      <p:grpSpPr>
+        <a:xfrm>
+          <a:off x="0" y="0"/>
+          <a:ext cx="0" cy="0"/>
+          <a:chOff x="0" y="0"/>
+          <a:chExt cx="0" cy="0"/>
+        </a:xfrm>
+      </p:grpSpPr>
+      <p:grpSp>
+        <p:nvGrpSpPr>
+          <p:cNvPr id="7" name="Group 6">
+            <a:extLst>
+              <a:ext uri="{FF2B5EF4-FFF2-40B4-BE49-F238E27FC236}">
+                <a16:creationId xmlns:a16="http://schemas.microsoft.com/office/drawing/2014/main" id="{5021FF8E-1E77-B949-8855-AA0EF7C5C48E}"/>
+              </a:ext>
+            </a:extLst>
+          </p:cNvPr>
+          <p:cNvGrpSpPr/>
+          <p:nvPr/>
+        </p:nvGrpSpPr>
+        <p:grpSpPr>
+          <a:xfrm>
+            <a:off x="247940" y="3100578"/>
+            <a:ext cx="3745692" cy="1896367"/>
+            <a:chOff x="460245" y="457465"/>
+            <a:chExt cx="4389120" cy="2743200"/>
+          </a:xfrm>
+        </p:grpSpPr>
+        <p:pic>
+          <p:nvPicPr>
+            <p:cNvPr id="8" name="Picture 7">
+              <a:extLst>
+                <a:ext uri="{FF2B5EF4-FFF2-40B4-BE49-F238E27FC236}">
+                  <a16:creationId xmlns:a16="http://schemas.microsoft.com/office/drawing/2014/main" id="{F38C191D-4E4F-434C-A241-E4A11E43AF79}"/>
+                </a:ext>
+              </a:extLst>
+            </p:cNvPr>
+            <p:cNvPicPr>
+              <a:picLocks noChangeAspect="1"/>
+            </p:cNvPicPr>
+            <p:nvPr/>
+          </p:nvPicPr>
+          <p:blipFill>
+            <a:blip r:embed="rId3" cstate="print">
+              <a:extLst>
+                <a:ext uri="{28A0092B-C50C-407E-A947-70E740481C1C}">
+                  <a14:useLocalDpi xmlns:a14="http://schemas.microsoft.com/office/drawing/2010/main" val="0"/>
+                </a:ext>
+              </a:extLst>
+            </a:blip>
+            <a:stretch>
+              <a:fillRect/>
+            </a:stretch>
+          </p:blipFill>
+          <p:spPr>
+            <a:xfrm>
+              <a:off x="460245" y="457465"/>
+              <a:ext cx="4389120" cy="2743200"/>
+            </a:xfrm>
+            <a:prstGeom prst="rect">
+              <a:avLst/>
+            </a:prstGeom>
+          </p:spPr>
+        </p:pic>
+        <p:cxnSp>
+          <p:nvCxnSpPr>
+            <p:cNvPr id="9" name="Straight Connector 8">
+              <a:extLst>
+                <a:ext uri="{FF2B5EF4-FFF2-40B4-BE49-F238E27FC236}">
+                  <a16:creationId xmlns:a16="http://schemas.microsoft.com/office/drawing/2014/main" id="{2162DDA1-F200-F241-B4A7-CFBF84BD86D4}"/>
+                </a:ext>
+              </a:extLst>
+            </p:cNvPr>
+            <p:cNvCxnSpPr/>
+            <p:nvPr/>
+          </p:nvCxnSpPr>
+          <p:spPr>
+            <a:xfrm>
+              <a:off x="780371" y="493588"/>
+              <a:ext cx="0" cy="2210867"/>
+            </a:xfrm>
+            <a:prstGeom prst="line">
+              <a:avLst/>
+            </a:prstGeom>
+            <a:ln w="12700">
+              <a:solidFill>
+                <a:schemeClr val="tx1"/>
+              </a:solidFill>
+            </a:ln>
+          </p:spPr>
+          <p:style>
+            <a:lnRef idx="1">
+              <a:schemeClr val="accent1"/>
+            </a:lnRef>
+            <a:fillRef idx="0">
+              <a:schemeClr val="accent1"/>
+            </a:fillRef>
+            <a:effectRef idx="0">
+              <a:schemeClr val="accent1"/>
+            </a:effectRef>
+            <a:fontRef idx="minor">
+              <a:schemeClr val="tx1"/>
+            </a:fontRef>
+          </p:style>
+        </p:cxnSp>
+        <p:cxnSp>
+          <p:nvCxnSpPr>
+            <p:cNvPr id="10" name="Straight Connector 9">
+              <a:extLst>
+                <a:ext uri="{FF2B5EF4-FFF2-40B4-BE49-F238E27FC236}">
+                  <a16:creationId xmlns:a16="http://schemas.microsoft.com/office/drawing/2014/main" id="{0C9C5C75-5BBF-2248-BDF3-2C0E9726F66A}"/>
+                </a:ext>
+              </a:extLst>
+            </p:cNvPr>
+            <p:cNvCxnSpPr>
+              <a:cxnSpLocks/>
+            </p:cNvCxnSpPr>
+            <p:nvPr/>
+          </p:nvCxnSpPr>
+          <p:spPr>
+            <a:xfrm>
+              <a:off x="776959" y="2707867"/>
+              <a:ext cx="3939622" cy="0"/>
+            </a:xfrm>
+            <a:prstGeom prst="line">
+              <a:avLst/>
+            </a:prstGeom>
+            <a:ln w="12700">
+              <a:solidFill>
+                <a:schemeClr val="tx1"/>
+              </a:solidFill>
+            </a:ln>
+          </p:spPr>
+          <p:style>
+            <a:lnRef idx="1">
+              <a:schemeClr val="accent1"/>
+            </a:lnRef>
+            <a:fillRef idx="0">
+              <a:schemeClr val="accent1"/>
+            </a:fillRef>
+            <a:effectRef idx="0">
+              <a:schemeClr val="accent1"/>
+            </a:effectRef>
+            <a:fontRef idx="minor">
+              <a:schemeClr val="tx1"/>
+            </a:fontRef>
+          </p:style>
+        </p:cxnSp>
+      </p:grpSp>
+      <p:grpSp>
+        <p:nvGrpSpPr>
+          <p:cNvPr id="11" name="Group 10">
+            <a:extLst>
+              <a:ext uri="{FF2B5EF4-FFF2-40B4-BE49-F238E27FC236}">
+                <a16:creationId xmlns:a16="http://schemas.microsoft.com/office/drawing/2014/main" id="{C40BCDAC-F5DE-E942-90A4-B050F883267D}"/>
+              </a:ext>
+            </a:extLst>
+          </p:cNvPr>
+          <p:cNvGrpSpPr/>
+          <p:nvPr/>
+        </p:nvGrpSpPr>
+        <p:grpSpPr>
+          <a:xfrm>
+            <a:off x="247943" y="4961633"/>
+            <a:ext cx="3745689" cy="1896367"/>
+            <a:chOff x="5232998" y="353261"/>
+            <a:chExt cx="4389120" cy="2743200"/>
+          </a:xfrm>
+        </p:grpSpPr>
+        <p:pic>
+          <p:nvPicPr>
+            <p:cNvPr id="12" name="Picture 11">
+              <a:extLst>
+                <a:ext uri="{FF2B5EF4-FFF2-40B4-BE49-F238E27FC236}">
+                  <a16:creationId xmlns:a16="http://schemas.microsoft.com/office/drawing/2014/main" id="{EF9B2D7F-F5D5-914D-A518-2287CAB40AB3}"/>
+                </a:ext>
+              </a:extLst>
+            </p:cNvPr>
+            <p:cNvPicPr>
+              <a:picLocks noChangeAspect="1"/>
+            </p:cNvPicPr>
+            <p:nvPr/>
+          </p:nvPicPr>
+          <p:blipFill>
+            <a:blip r:embed="rId4" cstate="print">
+              <a:extLst>
+                <a:ext uri="{28A0092B-C50C-407E-A947-70E740481C1C}">
+                  <a14:useLocalDpi xmlns:a14="http://schemas.microsoft.com/office/drawing/2010/main" val="0"/>
+                </a:ext>
+              </a:extLst>
+            </a:blip>
+            <a:stretch>
+              <a:fillRect/>
+            </a:stretch>
+          </p:blipFill>
+          <p:spPr>
+            <a:xfrm>
+              <a:off x="5232998" y="353261"/>
+              <a:ext cx="4389120" cy="2743200"/>
+            </a:xfrm>
+            <a:prstGeom prst="rect">
+              <a:avLst/>
+            </a:prstGeom>
+          </p:spPr>
+        </p:pic>
+        <p:cxnSp>
+          <p:nvCxnSpPr>
+            <p:cNvPr id="13" name="Straight Connector 12">
+              <a:extLst>
+                <a:ext uri="{FF2B5EF4-FFF2-40B4-BE49-F238E27FC236}">
+                  <a16:creationId xmlns:a16="http://schemas.microsoft.com/office/drawing/2014/main" id="{CDCFC749-9145-1843-AD62-438D58E45285}"/>
+                </a:ext>
+              </a:extLst>
+            </p:cNvPr>
+            <p:cNvCxnSpPr>
+              <a:cxnSpLocks/>
+            </p:cNvCxnSpPr>
+            <p:nvPr/>
+          </p:nvCxnSpPr>
+          <p:spPr>
+            <a:xfrm>
+              <a:off x="5546418" y="447675"/>
+              <a:ext cx="0" cy="2171957"/>
+            </a:xfrm>
+            <a:prstGeom prst="line">
+              <a:avLst/>
+            </a:prstGeom>
+            <a:ln w="12700">
+              <a:solidFill>
+                <a:schemeClr val="tx1"/>
+              </a:solidFill>
+            </a:ln>
+          </p:spPr>
+          <p:style>
+            <a:lnRef idx="1">
+              <a:schemeClr val="accent1"/>
+            </a:lnRef>
+            <a:fillRef idx="0">
+              <a:schemeClr val="accent1"/>
+            </a:fillRef>
+            <a:effectRef idx="0">
+              <a:schemeClr val="accent1"/>
+            </a:effectRef>
+            <a:fontRef idx="minor">
+              <a:schemeClr val="tx1"/>
+            </a:fontRef>
+          </p:style>
+        </p:cxnSp>
+        <p:cxnSp>
+          <p:nvCxnSpPr>
+            <p:cNvPr id="14" name="Straight Connector 13">
+              <a:extLst>
+                <a:ext uri="{FF2B5EF4-FFF2-40B4-BE49-F238E27FC236}">
+                  <a16:creationId xmlns:a16="http://schemas.microsoft.com/office/drawing/2014/main" id="{16D54ED4-5661-9540-BEAB-23D7D35D104B}"/>
+                </a:ext>
+              </a:extLst>
+            </p:cNvPr>
+            <p:cNvCxnSpPr/>
+            <p:nvPr/>
+          </p:nvCxnSpPr>
+          <p:spPr>
+            <a:xfrm>
+              <a:off x="5542888" y="2616102"/>
+              <a:ext cx="3943571" cy="0"/>
+            </a:xfrm>
+            <a:prstGeom prst="line">
+              <a:avLst/>
+            </a:prstGeom>
+            <a:ln w="12700">
+              <a:solidFill>
+                <a:schemeClr val="tx1"/>
+              </a:solidFill>
+            </a:ln>
+          </p:spPr>
+          <p:style>
+            <a:lnRef idx="1">
+              <a:schemeClr val="accent1"/>
+            </a:lnRef>
+            <a:fillRef idx="0">
+              <a:schemeClr val="accent1"/>
+            </a:fillRef>
+            <a:effectRef idx="0">
+              <a:schemeClr val="accent1"/>
+            </a:effectRef>
+            <a:fontRef idx="minor">
+              <a:schemeClr val="tx1"/>
+            </a:fontRef>
+          </p:style>
+        </p:cxnSp>
+      </p:grpSp>
+      <p:pic>
+        <p:nvPicPr>
+          <p:cNvPr id="15" name="Picture 14">
+            <a:extLst>
+              <a:ext uri="{FF2B5EF4-FFF2-40B4-BE49-F238E27FC236}">
+                <a16:creationId xmlns:a16="http://schemas.microsoft.com/office/drawing/2014/main" id="{831BF35A-B947-4547-BF89-FFC94B7E9DFA}"/>
+              </a:ext>
+            </a:extLst>
+          </p:cNvPr>
+          <p:cNvPicPr>
+            <a:picLocks noChangeAspect="1"/>
+          </p:cNvPicPr>
+          <p:nvPr/>
+        </p:nvPicPr>
+        <p:blipFill rotWithShape="1">
+          <a:blip r:embed="rId5" cstate="print">
+            <a:extLst>
+              <a:ext uri="{28A0092B-C50C-407E-A947-70E740481C1C}">
+                <a14:useLocalDpi xmlns:a14="http://schemas.microsoft.com/office/drawing/2010/main" val="0"/>
+              </a:ext>
+            </a:extLst>
+          </a:blip>
+          <a:srcRect r="82" b="7324"/>
+          <a:stretch/>
+        </p:blipFill>
+        <p:spPr>
+          <a:xfrm>
+            <a:off x="4872807" y="126141"/>
+            <a:ext cx="5080554" cy="6731859"/>
+          </a:xfrm>
+          <a:prstGeom prst="rect">
+            <a:avLst/>
+          </a:prstGeom>
+        </p:spPr>
+      </p:pic>
+      <p:grpSp>
+        <p:nvGrpSpPr>
+          <p:cNvPr id="16" name="Group 15">
+            <a:extLst>
+              <a:ext uri="{FF2B5EF4-FFF2-40B4-BE49-F238E27FC236}">
+                <a16:creationId xmlns:a16="http://schemas.microsoft.com/office/drawing/2014/main" id="{D750FF4E-AFCC-C346-B0EC-41E90C11260A}"/>
+              </a:ext>
+            </a:extLst>
+          </p:cNvPr>
+          <p:cNvGrpSpPr/>
+          <p:nvPr/>
+        </p:nvGrpSpPr>
+        <p:grpSpPr>
+          <a:xfrm>
+            <a:off x="289595" y="0"/>
+            <a:ext cx="3648892" cy="3103017"/>
+            <a:chOff x="608588" y="292460"/>
+            <a:chExt cx="3806657" cy="3442061"/>
+          </a:xfrm>
+        </p:grpSpPr>
+        <p:pic>
+          <p:nvPicPr>
+            <p:cNvPr id="17" name="Picture 16">
+              <a:extLst>
+                <a:ext uri="{FF2B5EF4-FFF2-40B4-BE49-F238E27FC236}">
+                  <a16:creationId xmlns:a16="http://schemas.microsoft.com/office/drawing/2014/main" id="{DDB500D0-CBD2-5A43-BCC4-BCAB36303337}"/>
+                </a:ext>
+              </a:extLst>
+            </p:cNvPr>
+            <p:cNvPicPr>
+              <a:picLocks noChangeAspect="1"/>
+            </p:cNvPicPr>
+            <p:nvPr/>
+          </p:nvPicPr>
+          <p:blipFill rotWithShape="1">
+            <a:blip r:embed="rId6" cstate="print">
+              <a:extLst>
+                <a:ext uri="{28A0092B-C50C-407E-A947-70E740481C1C}">
+                  <a14:useLocalDpi xmlns:a14="http://schemas.microsoft.com/office/drawing/2010/main" val="0"/>
+                </a:ext>
+              </a:extLst>
+            </a:blip>
+            <a:srcRect r="17055"/>
+            <a:stretch/>
+          </p:blipFill>
+          <p:spPr>
+            <a:xfrm>
+              <a:off x="608588" y="292460"/>
+              <a:ext cx="3806657" cy="3442061"/>
+            </a:xfrm>
+            <a:prstGeom prst="rect">
+              <a:avLst/>
+            </a:prstGeom>
+          </p:spPr>
+        </p:pic>
+        <p:sp>
+          <p:nvSpPr>
+            <p:cNvPr id="18" name="object 27">
+              <a:extLst>
+                <a:ext uri="{FF2B5EF4-FFF2-40B4-BE49-F238E27FC236}">
+                  <a16:creationId xmlns:a16="http://schemas.microsoft.com/office/drawing/2014/main" id="{E3A3D5FF-0A29-8F42-9258-8B25B879290F}"/>
+                </a:ext>
+              </a:extLst>
+            </p:cNvPr>
+            <p:cNvSpPr>
+              <a:spLocks noChangeAspect="1"/>
+            </p:cNvSpPr>
+            <p:nvPr/>
+          </p:nvSpPr>
+          <p:spPr>
+            <a:xfrm>
+              <a:off x="2607693" y="547007"/>
+              <a:ext cx="84582" cy="82098"/>
+            </a:xfrm>
+            <a:custGeom>
+              <a:avLst/>
+              <a:gdLst/>
+              <a:ahLst/>
+              <a:cxnLst/>
+              <a:rect l="l" t="t" r="r" b="b"/>
+              <a:pathLst>
+                <a:path w="140970" h="105409">
+                  <a:moveTo>
+                    <a:pt x="70375" y="0"/>
+                  </a:moveTo>
+                  <a:lnTo>
+                    <a:pt x="140750" y="105410"/>
+                  </a:lnTo>
+                  <a:lnTo>
+                    <a:pt x="0" y="105410"/>
+                  </a:lnTo>
+                  <a:lnTo>
+                    <a:pt x="70375" y="0"/>
+                  </a:lnTo>
+                </a:path>
+              </a:pathLst>
+            </a:custGeom>
+            <a:ln w="6350">
+              <a:solidFill>
+                <a:srgbClr val="FF6600"/>
+              </a:solidFill>
+            </a:ln>
+          </p:spPr>
+          <p:txBody>
+            <a:bodyPr wrap="square" lIns="0" tIns="0" rIns="0" bIns="0" rtlCol="0"/>
+            <a:lstStyle/>
+            <a:p>
+              <a:pPr marL="0" marR="0" lvl="0" indent="0" algn="l" defTabSz="914400" rtl="0" eaLnBrk="1" fontAlgn="auto" latinLnBrk="0" hangingPunct="1">
+                <a:lnSpc>
+                  <a:spcPct val="100000"/>
+                </a:lnSpc>
+                <a:spcBef>
+                  <a:spcPts val="0"/>
+                </a:spcBef>
+                <a:spcAft>
+                  <a:spcPts val="0"/>
+                </a:spcAft>
+                <a:buClrTx/>
+                <a:buSzTx/>
+                <a:buFontTx/>
+                <a:buNone/>
+                <a:tabLst/>
+                <a:defRPr/>
+              </a:pPr>
+              <a:endParaRPr kumimoji="0" sz="1800" b="0" i="0" u="none" strike="noStrike" kern="1200" cap="none" spc="0" normalizeH="0" baseline="0" noProof="0">
+                <a:ln>
+                  <a:noFill/>
+                </a:ln>
+                <a:solidFill>
+                  <a:prstClr val="black"/>
+                </a:solidFill>
+                <a:effectLst/>
+                <a:uLnTx/>
+                <a:uFillTx/>
+                <a:latin typeface="Calibri"/>
+                <a:ea typeface="+mn-ea"/>
+                <a:cs typeface="+mn-cs"/>
+              </a:endParaRPr>
+            </a:p>
+          </p:txBody>
+        </p:sp>
+        <p:sp>
+          <p:nvSpPr>
+            <p:cNvPr id="19" name="Oval 18">
+              <a:extLst>
+                <a:ext uri="{FF2B5EF4-FFF2-40B4-BE49-F238E27FC236}">
+                  <a16:creationId xmlns:a16="http://schemas.microsoft.com/office/drawing/2014/main" id="{B5307ACA-3AB7-8C43-8280-32AF51B56396}"/>
+                </a:ext>
+              </a:extLst>
+            </p:cNvPr>
+            <p:cNvSpPr>
+              <a:spLocks noChangeAspect="1"/>
+            </p:cNvSpPr>
+            <p:nvPr/>
+          </p:nvSpPr>
+          <p:spPr>
+            <a:xfrm>
+              <a:off x="2607701" y="438820"/>
+              <a:ext cx="79266" cy="82098"/>
+            </a:xfrm>
+            <a:prstGeom prst="ellipse">
+              <a:avLst/>
+            </a:prstGeom>
+            <a:solidFill>
+              <a:schemeClr val="bg1"/>
+            </a:solidFill>
+            <a:ln w="6350">
+              <a:solidFill>
+                <a:srgbClr val="FF6600"/>
+              </a:solidFill>
+            </a:ln>
+          </p:spPr>
+          <p:style>
+            <a:lnRef idx="2">
+              <a:schemeClr val="accent1">
+                <a:shade val="50000"/>
+              </a:schemeClr>
+            </a:lnRef>
+            <a:fillRef idx="1">
+              <a:schemeClr val="accent1"/>
+            </a:fillRef>
+            <a:effectRef idx="0">
+              <a:schemeClr val="accent1"/>
+            </a:effectRef>
+            <a:fontRef idx="minor">
+              <a:schemeClr val="lt1"/>
+            </a:fontRef>
+          </p:style>
+          <p:txBody>
+            <a:bodyPr rtlCol="0" anchor="ctr"/>
+            <a:lstStyle/>
+            <a:p>
+              <a:pPr marL="0" marR="0" lvl="0" indent="0" algn="ctr" defTabSz="914400" rtl="0" eaLnBrk="1" fontAlgn="auto" latinLnBrk="0" hangingPunct="1">
+                <a:lnSpc>
+                  <a:spcPct val="100000"/>
+                </a:lnSpc>
+                <a:spcBef>
+                  <a:spcPts val="0"/>
+                </a:spcBef>
+                <a:spcAft>
+                  <a:spcPts val="0"/>
+                </a:spcAft>
+                <a:buClrTx/>
+                <a:buSzTx/>
+                <a:buFontTx/>
+                <a:buNone/>
+                <a:tabLst/>
+                <a:defRPr/>
+              </a:pPr>
+              <a:endParaRPr kumimoji="0" lang="en-GB" sz="1800" b="0" i="0" u="none" strike="noStrike" kern="1200" cap="none" spc="0" normalizeH="0" baseline="0" noProof="0">
+                <a:ln>
+                  <a:noFill/>
+                </a:ln>
+                <a:solidFill>
+                  <a:prstClr val="white"/>
+                </a:solidFill>
+                <a:effectLst/>
+                <a:uLnTx/>
+                <a:uFillTx/>
+                <a:latin typeface="Calibri"/>
+                <a:ea typeface="+mn-ea"/>
+                <a:cs typeface="+mn-cs"/>
+              </a:endParaRPr>
+            </a:p>
+          </p:txBody>
+        </p:sp>
+        <p:sp>
+          <p:nvSpPr>
+            <p:cNvPr id="20" name="object 27">
+              <a:extLst>
+                <a:ext uri="{FF2B5EF4-FFF2-40B4-BE49-F238E27FC236}">
+                  <a16:creationId xmlns:a16="http://schemas.microsoft.com/office/drawing/2014/main" id="{B140E24B-BC05-D045-88AD-883D81C90254}"/>
+                </a:ext>
+              </a:extLst>
+            </p:cNvPr>
+            <p:cNvSpPr>
+              <a:spLocks noChangeAspect="1"/>
+            </p:cNvSpPr>
+            <p:nvPr/>
+          </p:nvSpPr>
+          <p:spPr>
+            <a:xfrm>
+              <a:off x="3544837" y="540570"/>
+              <a:ext cx="84582" cy="82098"/>
+            </a:xfrm>
+            <a:custGeom>
+              <a:avLst/>
+              <a:gdLst/>
+              <a:ahLst/>
+              <a:cxnLst/>
+              <a:rect l="l" t="t" r="r" b="b"/>
+              <a:pathLst>
+                <a:path w="140970" h="105409">
+                  <a:moveTo>
+                    <a:pt x="70375" y="0"/>
+                  </a:moveTo>
+                  <a:lnTo>
+                    <a:pt x="140750" y="105410"/>
+                  </a:lnTo>
+                  <a:lnTo>
+                    <a:pt x="0" y="105410"/>
+                  </a:lnTo>
+                  <a:lnTo>
+                    <a:pt x="70375" y="0"/>
+                  </a:lnTo>
+                </a:path>
+              </a:pathLst>
+            </a:custGeom>
+            <a:solidFill>
+              <a:srgbClr val="7765E1"/>
+            </a:solidFill>
+            <a:ln w="6350">
+              <a:solidFill>
+                <a:srgbClr val="7259DD"/>
+              </a:solidFill>
+            </a:ln>
+          </p:spPr>
+          <p:txBody>
+            <a:bodyPr wrap="square" lIns="0" tIns="0" rIns="0" bIns="0" rtlCol="0"/>
+            <a:lstStyle/>
+            <a:p>
+              <a:pPr marL="0" marR="0" lvl="0" indent="0" algn="l" defTabSz="914400" rtl="0" eaLnBrk="1" fontAlgn="auto" latinLnBrk="0" hangingPunct="1">
+                <a:lnSpc>
+                  <a:spcPct val="100000"/>
+                </a:lnSpc>
+                <a:spcBef>
+                  <a:spcPts val="0"/>
+                </a:spcBef>
+                <a:spcAft>
+                  <a:spcPts val="0"/>
+                </a:spcAft>
+                <a:buClrTx/>
+                <a:buSzTx/>
+                <a:buFontTx/>
+                <a:buNone/>
+                <a:tabLst/>
+                <a:defRPr/>
+              </a:pPr>
+              <a:endParaRPr kumimoji="0" sz="1800" b="0" i="0" u="none" strike="noStrike" kern="1200" cap="none" spc="0" normalizeH="0" baseline="0" noProof="0">
+                <a:ln>
+                  <a:noFill/>
+                </a:ln>
+                <a:solidFill>
+                  <a:prstClr val="black"/>
+                </a:solidFill>
+                <a:effectLst/>
+                <a:uLnTx/>
+                <a:uFillTx/>
+                <a:latin typeface="Calibri"/>
+                <a:ea typeface="+mn-ea"/>
+                <a:cs typeface="+mn-cs"/>
+              </a:endParaRPr>
+            </a:p>
+          </p:txBody>
+        </p:sp>
+        <p:sp>
+          <p:nvSpPr>
+            <p:cNvPr id="21" name="Oval 20">
+              <a:extLst>
+                <a:ext uri="{FF2B5EF4-FFF2-40B4-BE49-F238E27FC236}">
+                  <a16:creationId xmlns:a16="http://schemas.microsoft.com/office/drawing/2014/main" id="{872FAF5A-DE85-AA49-9D94-49795B11B588}"/>
+                </a:ext>
+              </a:extLst>
+            </p:cNvPr>
+            <p:cNvSpPr>
+              <a:spLocks noChangeAspect="1"/>
+            </p:cNvSpPr>
+            <p:nvPr/>
+          </p:nvSpPr>
+          <p:spPr>
+            <a:xfrm>
+              <a:off x="3544845" y="432383"/>
+              <a:ext cx="79266" cy="82098"/>
+            </a:xfrm>
+            <a:prstGeom prst="ellipse">
+              <a:avLst/>
+            </a:prstGeom>
+            <a:solidFill>
+              <a:srgbClr val="7765E1"/>
+            </a:solidFill>
+            <a:ln w="6350">
+              <a:solidFill>
+                <a:srgbClr val="7259DD"/>
+              </a:solidFill>
+            </a:ln>
+          </p:spPr>
+          <p:style>
+            <a:lnRef idx="2">
+              <a:schemeClr val="accent1">
+                <a:shade val="50000"/>
+              </a:schemeClr>
+            </a:lnRef>
+            <a:fillRef idx="1">
+              <a:schemeClr val="accent1"/>
+            </a:fillRef>
+            <a:effectRef idx="0">
+              <a:schemeClr val="accent1"/>
+            </a:effectRef>
+            <a:fontRef idx="minor">
+              <a:schemeClr val="lt1"/>
+            </a:fontRef>
+          </p:style>
+          <p:txBody>
+            <a:bodyPr rtlCol="0" anchor="ctr"/>
+            <a:lstStyle/>
+            <a:p>
+              <a:pPr marL="0" marR="0" lvl="0" indent="0" algn="ctr" defTabSz="914400" rtl="0" eaLnBrk="1" fontAlgn="auto" latinLnBrk="0" hangingPunct="1">
+                <a:lnSpc>
+                  <a:spcPct val="100000"/>
+                </a:lnSpc>
+                <a:spcBef>
+                  <a:spcPts val="0"/>
+                </a:spcBef>
+                <a:spcAft>
+                  <a:spcPts val="0"/>
+                </a:spcAft>
+                <a:buClrTx/>
+                <a:buSzTx/>
+                <a:buFontTx/>
+                <a:buNone/>
+                <a:tabLst/>
+                <a:defRPr/>
+              </a:pPr>
+              <a:endParaRPr kumimoji="0" lang="en-GB" sz="1800" b="0" i="0" u="none" strike="noStrike" kern="1200" cap="none" spc="0" normalizeH="0" baseline="0" noProof="0">
+                <a:ln>
+                  <a:noFill/>
+                </a:ln>
+                <a:solidFill>
+                  <a:prstClr val="white"/>
+                </a:solidFill>
+                <a:effectLst/>
+                <a:uLnTx/>
+                <a:uFillTx/>
+                <a:latin typeface="Calibri"/>
+                <a:ea typeface="+mn-ea"/>
+                <a:cs typeface="+mn-cs"/>
+              </a:endParaRPr>
+            </a:p>
+          </p:txBody>
+        </p:sp>
+      </p:grpSp>
+    </p:spTree>
+    <p:extLst>
+      <p:ext uri="{BB962C8B-B14F-4D97-AF65-F5344CB8AC3E}">
+        <p14:creationId xmlns:p14="http://schemas.microsoft.com/office/powerpoint/2010/main" val="3367772340"/>
+      </p:ext>
+    </p:extLst>
+  </p:cSld>
+  <p:clrMapOvr>
+    <a:masterClrMapping/>
+  </p:clrMapOvr>
+</p:sld>
+</file>
+
+<file path=ppt/slides/slide4.xml><?xml version="1.0" encoding="utf-8"?>
+<p:sld xmlns:a="http://schemas.openxmlformats.org/drawingml/2006/main" xmlns:r="http://schemas.openxmlformats.org/officeDocument/2006/relationships" xmlns:p="http://schemas.openxmlformats.org/presentationml/2006/main">
+  <p:cSld>
+    <p:spTree>
+      <p:nvGrpSpPr>
+        <p:cNvPr id="1" name=""/>
+        <p:cNvGrpSpPr/>
+        <p:nvPr/>
+      </p:nvGrpSpPr>
+      <p:grpSpPr>
+        <a:xfrm>
+          <a:off x="0" y="0"/>
+          <a:ext cx="0" cy="0"/>
+          <a:chOff x="0" y="0"/>
+          <a:chExt cx="0" cy="0"/>
+        </a:xfrm>
+      </p:grpSpPr>
+      <p:pic>
+        <p:nvPicPr>
+          <p:cNvPr id="2" name="Picture 1">
+            <a:extLst>
+              <a:ext uri="{FF2B5EF4-FFF2-40B4-BE49-F238E27FC236}">
+                <a16:creationId xmlns:a16="http://schemas.microsoft.com/office/drawing/2014/main" id="{CEE93C00-40B8-F242-BADD-143FAE98EE14}"/>
+              </a:ext>
+            </a:extLst>
+          </p:cNvPr>
+          <p:cNvPicPr>
+            <a:picLocks noChangeAspect="1"/>
+          </p:cNvPicPr>
+          <p:nvPr/>
+        </p:nvPicPr>
+        <p:blipFill rotWithShape="1">
+          <a:blip r:embed="rId3" cstate="print">
+            <a:extLst>
+              <a:ext uri="{28A0092B-C50C-407E-A947-70E740481C1C}">
+                <a14:useLocalDpi xmlns:a14="http://schemas.microsoft.com/office/drawing/2010/main" val="0"/>
+              </a:ext>
+            </a:extLst>
+          </a:blip>
+          <a:srcRect t="5427"/>
+          <a:stretch/>
+        </p:blipFill>
+        <p:spPr>
+          <a:xfrm>
+            <a:off x="0" y="749616"/>
+            <a:ext cx="8672104" cy="4100735"/>
+          </a:xfrm>
+          <a:prstGeom prst="rect">
+            <a:avLst/>
+          </a:prstGeom>
+        </p:spPr>
+      </p:pic>
+      <p:pic>
+        <p:nvPicPr>
+          <p:cNvPr id="4" name="Picture 3">
+            <a:extLst>
+              <a:ext uri="{FF2B5EF4-FFF2-40B4-BE49-F238E27FC236}">
+                <a16:creationId xmlns:a16="http://schemas.microsoft.com/office/drawing/2014/main" id="{FE3A9B50-77C1-DB4D-BF36-C8C3AD28B9CC}"/>
+              </a:ext>
+            </a:extLst>
+          </p:cNvPr>
+          <p:cNvPicPr>
+            <a:picLocks noChangeAspect="1"/>
+          </p:cNvPicPr>
+          <p:nvPr/>
+        </p:nvPicPr>
+        <p:blipFill>
+          <a:blip r:embed="rId4"/>
+          <a:stretch>
+            <a:fillRect/>
+          </a:stretch>
+        </p:blipFill>
+        <p:spPr>
+          <a:xfrm>
+            <a:off x="4336052" y="557908"/>
+            <a:ext cx="4394200" cy="2172750"/>
+          </a:xfrm>
+          <a:prstGeom prst="rect">
+            <a:avLst/>
+          </a:prstGeom>
+        </p:spPr>
+      </p:pic>
+      <p:sp>
+        <p:nvSpPr>
+          <p:cNvPr id="5" name="TextBox 4">
+            <a:extLst>
+              <a:ext uri="{FF2B5EF4-FFF2-40B4-BE49-F238E27FC236}">
+                <a16:creationId xmlns:a16="http://schemas.microsoft.com/office/drawing/2014/main" id="{1BF7D0F7-71F1-6741-829A-6668EF182848}"/>
+              </a:ext>
+            </a:extLst>
+          </p:cNvPr>
+          <p:cNvSpPr txBox="1"/>
+          <p:nvPr/>
+        </p:nvSpPr>
+        <p:spPr>
+          <a:xfrm>
+            <a:off x="190500" y="5042059"/>
+            <a:ext cx="9093200" cy="1754326"/>
+          </a:xfrm>
+          <a:prstGeom prst="rect">
+            <a:avLst/>
+          </a:prstGeom>
+          <a:noFill/>
+        </p:spPr>
+        <p:txBody>
+          <a:bodyPr wrap="square" rtlCol="0">
+            <a:spAutoFit/>
+          </a:bodyPr>
+          <a:lstStyle/>
+          <a:p>
+            <a:r>
+              <a:rPr lang="en-US" dirty="0"/>
+              <a:t>Fig S2: </a:t>
+            </a:r>
+            <a:r>
+              <a:rPr lang="en-GB" dirty="0">
+                <a:solidFill>
+                  <a:prstClr val="black"/>
+                </a:solidFill>
+                <a:latin typeface="Arial" panose="020B0604020202020204" pitchFamily="34" charset="0"/>
+                <a:cs typeface="Arial" panose="020B0604020202020204" pitchFamily="34" charset="0"/>
+              </a:rPr>
+              <a:t>Differentially expressed genes (DEG) intersection plot using RNA-sequencing data from perirenal adipose tissue taken from Sham and thyroidectomised (TX) </a:t>
+            </a:r>
+            <a:r>
+              <a:rPr lang="en-GB" dirty="0" err="1">
+                <a:solidFill>
+                  <a:prstClr val="black"/>
+                </a:solidFill>
+                <a:latin typeface="Arial" panose="020B0604020202020204" pitchFamily="34" charset="0"/>
+                <a:cs typeface="Arial" panose="020B0604020202020204" pitchFamily="34" charset="0"/>
+              </a:rPr>
+              <a:t>fetuses</a:t>
+            </a:r>
+            <a:r>
+              <a:rPr lang="en-GB" dirty="0">
+                <a:solidFill>
+                  <a:prstClr val="black"/>
+                </a:solidFill>
+                <a:latin typeface="Arial" panose="020B0604020202020204" pitchFamily="34" charset="0"/>
+                <a:cs typeface="Arial" panose="020B0604020202020204" pitchFamily="34" charset="0"/>
+              </a:rPr>
+              <a:t> at 129 and 143 days of gestation (</a:t>
+            </a:r>
+            <a:r>
+              <a:rPr lang="en-GB" dirty="0" err="1">
+                <a:solidFill>
+                  <a:prstClr val="black"/>
+                </a:solidFill>
+                <a:latin typeface="Arial" panose="020B0604020202020204" pitchFamily="34" charset="0"/>
+                <a:cs typeface="Arial" panose="020B0604020202020204" pitchFamily="34" charset="0"/>
+              </a:rPr>
+              <a:t>dGA</a:t>
+            </a:r>
+            <a:r>
+              <a:rPr lang="en-GB" dirty="0">
+                <a:solidFill>
+                  <a:prstClr val="black"/>
+                </a:solidFill>
+                <a:latin typeface="Arial" panose="020B0604020202020204" pitchFamily="34" charset="0"/>
+                <a:cs typeface="Arial" panose="020B0604020202020204" pitchFamily="34" charset="0"/>
+              </a:rPr>
+              <a:t>). (A) Number of significant DEGs with an absolute log2 fold change &gt;= 1, </a:t>
+            </a:r>
+            <a:r>
+              <a:rPr lang="en-GB" dirty="0" err="1">
+                <a:solidFill>
+                  <a:prstClr val="black"/>
+                </a:solidFill>
+                <a:latin typeface="Arial" panose="020B0604020202020204" pitchFamily="34" charset="0"/>
+                <a:cs typeface="Arial" panose="020B0604020202020204" pitchFamily="34" charset="0"/>
+              </a:rPr>
+              <a:t>Padj</a:t>
+            </a:r>
+            <a:r>
+              <a:rPr lang="en-GB" dirty="0">
+                <a:solidFill>
+                  <a:prstClr val="black"/>
+                </a:solidFill>
+                <a:latin typeface="Arial" panose="020B0604020202020204" pitchFamily="34" charset="0"/>
+                <a:cs typeface="Arial" panose="020B0604020202020204" pitchFamily="34" charset="0"/>
+              </a:rPr>
+              <a:t> &lt; 0.05 , identified from comparisons between and within treatment and gestational age groups. (B) Number of uniquely significant DEGs for each selected comparisons after all possible intersections filtering out. </a:t>
+            </a:r>
+            <a:endParaRPr lang="en-US" dirty="0"/>
+          </a:p>
+        </p:txBody>
+      </p:sp>
+      <p:sp>
+        <p:nvSpPr>
+          <p:cNvPr id="6" name="TextBox 5">
+            <a:extLst>
+              <a:ext uri="{FF2B5EF4-FFF2-40B4-BE49-F238E27FC236}">
+                <a16:creationId xmlns:a16="http://schemas.microsoft.com/office/drawing/2014/main" id="{7B0654D3-6F81-4F43-8726-F1478963C778}"/>
+              </a:ext>
+            </a:extLst>
+          </p:cNvPr>
+          <p:cNvSpPr txBox="1"/>
+          <p:nvPr/>
+        </p:nvSpPr>
+        <p:spPr>
+          <a:xfrm>
+            <a:off x="1615576" y="749616"/>
+            <a:ext cx="1104900" cy="369332"/>
+          </a:xfrm>
+          <a:prstGeom prst="rect">
+            <a:avLst/>
+          </a:prstGeom>
+          <a:noFill/>
+        </p:spPr>
+        <p:txBody>
+          <a:bodyPr wrap="square" rtlCol="0">
+            <a:spAutoFit/>
+          </a:bodyPr>
+          <a:lstStyle/>
+          <a:p>
+            <a:r>
+              <a:rPr lang="en-US" dirty="0"/>
+              <a:t>(A)</a:t>
+            </a:r>
+          </a:p>
+        </p:txBody>
+      </p:sp>
+      <p:sp>
+        <p:nvSpPr>
+          <p:cNvPr id="7" name="TextBox 6">
+            <a:extLst>
+              <a:ext uri="{FF2B5EF4-FFF2-40B4-BE49-F238E27FC236}">
+                <a16:creationId xmlns:a16="http://schemas.microsoft.com/office/drawing/2014/main" id="{BEAA27FC-7815-E74D-B2C4-48019ECAA252}"/>
+              </a:ext>
+            </a:extLst>
+          </p:cNvPr>
+          <p:cNvSpPr txBox="1"/>
+          <p:nvPr/>
+        </p:nvSpPr>
+        <p:spPr>
+          <a:xfrm>
+            <a:off x="5080000" y="661032"/>
+            <a:ext cx="1104900" cy="369332"/>
+          </a:xfrm>
+          <a:prstGeom prst="rect">
+            <a:avLst/>
+          </a:prstGeom>
+          <a:noFill/>
+        </p:spPr>
+        <p:txBody>
+          <a:bodyPr wrap="square" rtlCol="0">
+            <a:spAutoFit/>
+          </a:bodyPr>
+          <a:lstStyle/>
+          <a:p>
+            <a:r>
+              <a:rPr lang="en-US" dirty="0"/>
+              <a:t>(B)</a:t>
+            </a:r>
+          </a:p>
+        </p:txBody>
+      </p:sp>
+    </p:spTree>
+    <p:extLst>
+      <p:ext uri="{BB962C8B-B14F-4D97-AF65-F5344CB8AC3E}">
+        <p14:creationId xmlns:p14="http://schemas.microsoft.com/office/powerpoint/2010/main" val="4255533420"/>
       </p:ext>
     </p:extLst>
   </p:cSld>
@@ -5110,4 +6909,299 @@
   <a:objectDefaults/>
   <a:extraClrSchemeLst/>
 </a:theme>
+</file>
+
+<file path=ppt/theme/theme2.xml><?xml version="1.0" encoding="utf-8"?>
+<a:theme xmlns:a="http://schemas.openxmlformats.org/drawingml/2006/main" name="Office Theme">
+  <a:themeElements>
+    <a:clrScheme name="Office">
+      <a:dk1>
+        <a:sysClr val="windowText" lastClr="000000"/>
+      </a:dk1>
+      <a:lt1>
+        <a:sysClr val="window" lastClr="FFFFFF"/>
+      </a:lt1>
+      <a:dk2>
+        <a:srgbClr val="44546A"/>
+      </a:dk2>
+      <a:lt2>
+        <a:srgbClr val="E7E6E6"/>
+      </a:lt2>
+      <a:accent1>
+        <a:srgbClr val="4472C4"/>
+      </a:accent1>
+      <a:accent2>
+        <a:srgbClr val="ED7D31"/>
+      </a:accent2>
+      <a:accent3>
+        <a:srgbClr val="A5A5A5"/>
+      </a:accent3>
+      <a:accent4>
+        <a:srgbClr val="FFC000"/>
+      </a:accent4>
+      <a:accent5>
+        <a:srgbClr val="5B9BD5"/>
+      </a:accent5>
+      <a:accent6>
+        <a:srgbClr val="70AD47"/>
+      </a:accent6>
+      <a:hlink>
+        <a:srgbClr val="0563C1"/>
+      </a:hlink>
+      <a:folHlink>
+        <a:srgbClr val="954F72"/>
+      </a:folHlink>
+    </a:clrScheme>
+    <a:fontScheme name="Office">
+      <a:majorFont>
+        <a:latin typeface="Calibri Light" panose="020F0302020204030204"/>
+        <a:ea typeface=""/>
+        <a:cs typeface=""/>
+        <a:font script="Jpan" typeface="游ゴシック Light"/>
+        <a:font script="Hang" typeface="맑은 고딕"/>
+        <a:font script="Hans" typeface="等线 Light"/>
+        <a:font script="Hant" typeface="新細明體"/>
+        <a:font script="Arab" typeface="Times New Roman"/>
+        <a:font script="Hebr" typeface="Times New Roman"/>
+        <a:font script="Thai" typeface="Angsana New"/>
+        <a:font script="Ethi" typeface="Nyala"/>
+        <a:font script="Beng" typeface="Vrinda"/>
+        <a:font script="Gujr" typeface="Shruti"/>
+        <a:font script="Khmr" typeface="MoolBoran"/>
+        <a:font script="Knda" typeface="Tunga"/>
+        <a:font script="Guru" typeface="Raavi"/>
+        <a:font script="Cans" typeface="Euphemia"/>
+        <a:font script="Cher" typeface="Plantagenet Cherokee"/>
+        <a:font script="Yiii" typeface="Microsoft Yi Baiti"/>
+        <a:font script="Tibt" typeface="Microsoft Himalaya"/>
+        <a:font script="Thaa" typeface="MV Boli"/>
+        <a:font script="Deva" typeface="Mangal"/>
+        <a:font script="Telu" typeface="Gautami"/>
+        <a:font script="Taml" typeface="Latha"/>
+        <a:font script="Syrc" typeface="Estrangelo Edessa"/>
+        <a:font script="Orya" typeface="Kalinga"/>
+        <a:font script="Mlym" typeface="Kartika"/>
+        <a:font script="Laoo" typeface="DokChampa"/>
+        <a:font script="Sinh" typeface="Iskoola Pota"/>
+        <a:font script="Mong" typeface="Mongolian Baiti"/>
+        <a:font script="Viet" typeface="Times New Roman"/>
+        <a:font script="Uigh" typeface="Microsoft Uighur"/>
+        <a:font script="Geor" typeface="Sylfaen"/>
+        <a:font script="Armn" typeface="Arial"/>
+        <a:font script="Bugi" typeface="Leelawadee UI"/>
+        <a:font script="Bopo" typeface="Microsoft JhengHei"/>
+        <a:font script="Java" typeface="Javanese Text"/>
+        <a:font script="Lisu" typeface="Segoe UI"/>
+        <a:font script="Mymr" typeface="Myanmar Text"/>
+        <a:font script="Nkoo" typeface="Ebrima"/>
+        <a:font script="Olck" typeface="Nirmala UI"/>
+        <a:font script="Osma" typeface="Ebrima"/>
+        <a:font script="Phag" typeface="Phagspa"/>
+        <a:font script="Syrn" typeface="Estrangelo Edessa"/>
+        <a:font script="Syrj" typeface="Estrangelo Edessa"/>
+        <a:font script="Syre" typeface="Estrangelo Edessa"/>
+        <a:font script="Sora" typeface="Nirmala UI"/>
+        <a:font script="Tale" typeface="Microsoft Tai Le"/>
+        <a:font script="Talu" typeface="Microsoft New Tai Lue"/>
+        <a:font script="Tfng" typeface="Ebrima"/>
+      </a:majorFont>
+      <a:minorFont>
+        <a:latin typeface="Calibri" panose="020F0502020204030204"/>
+        <a:ea typeface=""/>
+        <a:cs typeface=""/>
+        <a:font script="Jpan" typeface="游ゴシック"/>
+        <a:font script="Hang" typeface="맑은 고딕"/>
+        <a:font script="Hans" typeface="等线"/>
+        <a:font script="Hant" typeface="新細明體"/>
+        <a:font script="Arab" typeface="Arial"/>
+        <a:font script="Hebr" typeface="Arial"/>
+        <a:font script="Thai" typeface="Cordia New"/>
+        <a:font script="Ethi" typeface="Nyala"/>
+        <a:font script="Beng" typeface="Vrinda"/>
+        <a:font script="Gujr" typeface="Shruti"/>
+        <a:font script="Khmr" typeface="DaunPenh"/>
+        <a:font script="Knda" typeface="Tunga"/>
+        <a:font script="Guru" typeface="Raavi"/>
+        <a:font script="Cans" typeface="Euphemia"/>
+        <a:font script="Cher" typeface="Plantagenet Cherokee"/>
+        <a:font script="Yiii" typeface="Microsoft Yi Baiti"/>
+        <a:font script="Tibt" typeface="Microsoft Himalaya"/>
+        <a:font script="Thaa" typeface="MV Boli"/>
+        <a:font script="Deva" typeface="Mangal"/>
+        <a:font script="Telu" typeface="Gautami"/>
+        <a:font script="Taml" typeface="Latha"/>
+        <a:font script="Syrc" typeface="Estrangelo Edessa"/>
+        <a:font script="Orya" typeface="Kalinga"/>
+        <a:font script="Mlym" typeface="Kartika"/>
+        <a:font script="Laoo" typeface="DokChampa"/>
+        <a:font script="Sinh" typeface="Iskoola Pota"/>
+        <a:font script="Mong" typeface="Mongolian Baiti"/>
+        <a:font script="Viet" typeface="Arial"/>
+        <a:font script="Uigh" typeface="Microsoft Uighur"/>
+        <a:font script="Geor" typeface="Sylfaen"/>
+        <a:font script="Armn" typeface="Arial"/>
+        <a:font script="Bugi" typeface="Leelawadee UI"/>
+        <a:font script="Bopo" typeface="Microsoft JhengHei"/>
+        <a:font script="Java" typeface="Javanese Text"/>
+        <a:font script="Lisu" typeface="Segoe UI"/>
+        <a:font script="Mymr" typeface="Myanmar Text"/>
+        <a:font script="Nkoo" typeface="Ebrima"/>
+        <a:font script="Olck" typeface="Nirmala UI"/>
+        <a:font script="Osma" typeface="Ebrima"/>
+        <a:font script="Phag" typeface="Phagspa"/>
+        <a:font script="Syrn" typeface="Estrangelo Edessa"/>
+        <a:font script="Syrj" typeface="Estrangelo Edessa"/>
+        <a:font script="Syre" typeface="Estrangelo Edessa"/>
+        <a:font script="Sora" typeface="Nirmala UI"/>
+        <a:font script="Tale" typeface="Microsoft Tai Le"/>
+        <a:font script="Talu" typeface="Microsoft New Tai Lue"/>
+        <a:font script="Tfng" typeface="Ebrima"/>
+      </a:minorFont>
+    </a:fontScheme>
+    <a:fmtScheme name="Office">
+      <a:fillStyleLst>
+        <a:solidFill>
+          <a:schemeClr val="phClr"/>
+        </a:solidFill>
+        <a:gradFill rotWithShape="1">
+          <a:gsLst>
+            <a:gs pos="0">
+              <a:schemeClr val="phClr">
+                <a:lumMod val="110000"/>
+                <a:satMod val="105000"/>
+                <a:tint val="67000"/>
+              </a:schemeClr>
+            </a:gs>
+            <a:gs pos="50000">
+              <a:schemeClr val="phClr">
+                <a:lumMod val="105000"/>
+                <a:satMod val="103000"/>
+                <a:tint val="73000"/>
+              </a:schemeClr>
+            </a:gs>
+            <a:gs pos="100000">
+              <a:schemeClr val="phClr">
+                <a:lumMod val="105000"/>
+                <a:satMod val="109000"/>
+                <a:tint val="81000"/>
+              </a:schemeClr>
+            </a:gs>
+          </a:gsLst>
+          <a:lin ang="5400000" scaled="0"/>
+        </a:gradFill>
+        <a:gradFill rotWithShape="1">
+          <a:gsLst>
+            <a:gs pos="0">
+              <a:schemeClr val="phClr">
+                <a:satMod val="103000"/>
+                <a:lumMod val="102000"/>
+                <a:tint val="94000"/>
+              </a:schemeClr>
+            </a:gs>
+            <a:gs pos="50000">
+              <a:schemeClr val="phClr">
+                <a:satMod val="110000"/>
+                <a:lumMod val="100000"/>
+                <a:shade val="100000"/>
+              </a:schemeClr>
+            </a:gs>
+            <a:gs pos="100000">
+              <a:schemeClr val="phClr">
+                <a:lumMod val="99000"/>
+                <a:satMod val="120000"/>
+                <a:shade val="78000"/>
+              </a:schemeClr>
+            </a:gs>
+          </a:gsLst>
+          <a:lin ang="5400000" scaled="0"/>
+        </a:gradFill>
+      </a:fillStyleLst>
+      <a:lnStyleLst>
+        <a:ln w="6350" cap="flat" cmpd="sng" algn="ctr">
+          <a:solidFill>
+            <a:schemeClr val="phClr"/>
+          </a:solidFill>
+          <a:prstDash val="solid"/>
+          <a:miter lim="800000"/>
+        </a:ln>
+        <a:ln w="12700" cap="flat" cmpd="sng" algn="ctr">
+          <a:solidFill>
+            <a:schemeClr val="phClr"/>
+          </a:solidFill>
+          <a:prstDash val="solid"/>
+          <a:miter lim="800000"/>
+        </a:ln>
+        <a:ln w="19050" cap="flat" cmpd="sng" algn="ctr">
+          <a:solidFill>
+            <a:schemeClr val="phClr"/>
+          </a:solidFill>
+          <a:prstDash val="solid"/>
+          <a:miter lim="800000"/>
+        </a:ln>
+      </a:lnStyleLst>
+      <a:effectStyleLst>
+        <a:effectStyle>
+          <a:effectLst/>
+        </a:effectStyle>
+        <a:effectStyle>
+          <a:effectLst/>
+        </a:effectStyle>
+        <a:effectStyle>
+          <a:effectLst>
+            <a:outerShdw blurRad="57150" dist="19050" dir="5400000" algn="ctr" rotWithShape="0">
+              <a:srgbClr val="000000">
+                <a:alpha val="63000"/>
+              </a:srgbClr>
+            </a:outerShdw>
+          </a:effectLst>
+        </a:effectStyle>
+      </a:effectStyleLst>
+      <a:bgFillStyleLst>
+        <a:solidFill>
+          <a:schemeClr val="phClr"/>
+        </a:solidFill>
+        <a:solidFill>
+          <a:schemeClr val="phClr">
+            <a:tint val="95000"/>
+            <a:satMod val="170000"/>
+          </a:schemeClr>
+        </a:solidFill>
+        <a:gradFill rotWithShape="1">
+          <a:gsLst>
+            <a:gs pos="0">
+              <a:schemeClr val="phClr">
+                <a:tint val="93000"/>
+                <a:satMod val="150000"/>
+                <a:shade val="98000"/>
+                <a:lumMod val="102000"/>
+              </a:schemeClr>
+            </a:gs>
+            <a:gs pos="50000">
+              <a:schemeClr val="phClr">
+                <a:tint val="98000"/>
+                <a:satMod val="130000"/>
+                <a:shade val="90000"/>
+                <a:lumMod val="103000"/>
+              </a:schemeClr>
+            </a:gs>
+            <a:gs pos="100000">
+              <a:schemeClr val="phClr">
+                <a:shade val="63000"/>
+                <a:satMod val="120000"/>
+              </a:schemeClr>
+            </a:gs>
+          </a:gsLst>
+          <a:lin ang="5400000" scaled="0"/>
+        </a:gradFill>
+      </a:bgFillStyleLst>
+    </a:fmtScheme>
+  </a:themeElements>
+  <a:objectDefaults/>
+  <a:extraClrSchemeLst/>
+  <a:extLst>
+    <a:ext uri="{05A4C25C-085E-4340-85A3-A5531E510DB2}">
+      <thm15:themeFamily xmlns:thm15="http://schemas.microsoft.com/office/thememl/2012/main" name="Office Theme" id="{62F939B6-93AF-4DB8-9C6B-D6C7DFDC589F}" vid="{4A3C46E8-61CC-4603-A589-7422A47A8E4A}"/>
+    </a:ext>
+  </a:extLst>
+</a:theme>
 </file>
</xml_diff>